<commit_message>
updated tech to coding
</commit_message>
<xml_diff>
--- a/docs/Mini Project grp 10.pptx
+++ b/docs/Mini Project grp 10.pptx
@@ -1282,7 +1282,7 @@
         </p:nvSpPr>
         <p:spPr>
           <a:xfrm>
-            <a:off x="381300" y="685800"/>
+            <a:off x="381000" y="685800"/>
             <a:ext cx="6096000" cy="3429000"/>
           </a:xfrm>
           <a:custGeom>
@@ -1602,7 +1602,7 @@
         </p:nvSpPr>
         <p:spPr>
           <a:xfrm>
-            <a:off x="381300" y="685800"/>
+            <a:off x="381000" y="685800"/>
             <a:ext cx="6096000" cy="3429000"/>
           </a:xfrm>
           <a:custGeom>
@@ -10978,10 +10978,10 @@
               <a:buNone/>
             </a:pPr>
             <a:r>
-              <a:rPr lang="en"/>
+              <a:rPr lang="en" dirty="0"/>
               <a:t>•    Exploring new technology, knowledge, and skills is an important step to try to find a new passion or to polish an existing one.  But, finding and connecting with new people who share a common interest can be a bit overwhelming at times. </a:t>
             </a:r>
-            <a:endParaRPr/>
+            <a:endParaRPr dirty="0"/>
           </a:p>
           <a:p>
             <a:pPr marL="0" lvl="0" indent="0" algn="just" rtl="0">
@@ -10997,10 +10997,10 @@
               <a:buNone/>
             </a:pPr>
             <a:r>
-              <a:rPr lang="en"/>
+              <a:rPr lang="en" dirty="0"/>
               <a:t>•   We would be addressing this very issue by designing a centralized platform wherein students and teachers can build new connections, post information and stuff that can help to create an inspiring and encouraging environment to learn, develop and venture for all. </a:t>
             </a:r>
-            <a:endParaRPr/>
+            <a:endParaRPr dirty="0"/>
           </a:p>
           <a:p>
             <a:pPr marL="0" lvl="0" indent="0" algn="l" rtl="0">
@@ -11016,10 +11016,10 @@
               <a:buNone/>
             </a:pPr>
             <a:r>
-              <a:rPr lang="en"/>
-              <a:t>•    For this mini-project, we aim to develop an online social media platform at an institute level wherein students can connect with and share tech-related ideas, knowledge and help foster a rich tech culture in our college.</a:t>
+              <a:rPr lang="en" dirty="0"/>
+              <a:t>•    For this mini-project, we aim to develop an online social media platform at an institute level wherein students can connect with and share tech-related ideas, knowledge and help foster a rich coding culture in our college.</a:t>
             </a:r>
-            <a:endParaRPr/>
+            <a:endParaRPr dirty="0"/>
           </a:p>
         </p:txBody>
       </p:sp>
@@ -11445,10 +11445,14 @@
               <a:buNone/>
             </a:pPr>
             <a:r>
+              <a:rPr lang="en" dirty="0"/>
+              <a:t>1) To develop a </a:t>
+            </a:r>
+            <a:r>
               <a:rPr lang="en"/>
-              <a:t>1) To develop a rich tech culture in college. </a:t>
+              <a:t>rich coding culture in college. </a:t>
             </a:r>
-            <a:endParaRPr/>
+            <a:endParaRPr dirty="0"/>
           </a:p>
           <a:p>
             <a:pPr marL="0" lvl="0" indent="0" algn="l" rtl="0">
@@ -11461,10 +11465,10 @@
               <a:buNone/>
             </a:pPr>
             <a:r>
-              <a:rPr lang="en"/>
+              <a:rPr lang="en" dirty="0"/>
               <a:t>2) To help college students connect and interact in a way that would lead to their skill development. </a:t>
             </a:r>
-            <a:endParaRPr/>
+            <a:endParaRPr dirty="0"/>
           </a:p>
           <a:p>
             <a:pPr marL="0" lvl="0" indent="0" algn="l" rtl="0">
@@ -11477,10 +11481,10 @@
               <a:buNone/>
             </a:pPr>
             <a:r>
-              <a:rPr lang="en"/>
+              <a:rPr lang="en" dirty="0"/>
               <a:t>3) To keep everyone updated about the current technical scenario and to present them with opportunities which would strengthen their vital skills in their college years.</a:t>
             </a:r>
-            <a:endParaRPr/>
+            <a:endParaRPr dirty="0"/>
           </a:p>
         </p:txBody>
       </p:sp>

</xml_diff>